<commit_message>
Atualizando o e-book digital com novas modificações
</commit_message>
<xml_diff>
--- a/Ebook Digital.pptx
+++ b/Ebook Digital.pptx
@@ -244,7 +244,7 @@
           <a:p>
             <a:fld id="{55E237D1-EB3E-42ED-8017-A3E0F540A544}" type="datetimeFigureOut">
               <a:rPr lang="pt-BR" smtClean="0"/>
-              <a:t>31/12/2024</a:t>
+              <a:t>01/01/2025</a:t>
             </a:fld>
             <a:endParaRPr lang="pt-BR"/>
           </a:p>
@@ -421,7 +421,7 @@
           <a:p>
             <a:fld id="{AE8E0544-B9E7-47A8-ABD7-B3CFDECA6595}" type="datetimeFigureOut">
               <a:rPr lang="pt-BR" smtClean="0"/>
-              <a:t>31/12/2024</a:t>
+              <a:t>01/01/2025</a:t>
             </a:fld>
             <a:endParaRPr lang="pt-BR"/>
           </a:p>
@@ -819,7 +819,7 @@
           <a:p>
             <a:fld id="{CCC30072-6D31-42F3-B5CC-185B6D0A6822}" type="datetime1">
               <a:rPr lang="pt-BR" smtClean="0"/>
-              <a:t>31/12/2024</a:t>
+              <a:t>01/01/2025</a:t>
             </a:fld>
             <a:endParaRPr lang="pt-BR"/>
           </a:p>
@@ -992,7 +992,7 @@
           <a:p>
             <a:fld id="{BDF6D1A7-EFFC-4966-822B-4C00AB2CB4F1}" type="datetime1">
               <a:rPr lang="pt-BR" smtClean="0"/>
-              <a:t>31/12/2024</a:t>
+              <a:t>01/01/2025</a:t>
             </a:fld>
             <a:endParaRPr lang="pt-BR"/>
           </a:p>
@@ -1175,7 +1175,7 @@
           <a:p>
             <a:fld id="{C6FB7C60-0DA7-42D4-A820-E1D03EB49949}" type="datetime1">
               <a:rPr lang="pt-BR" smtClean="0"/>
-              <a:t>31/12/2024</a:t>
+              <a:t>01/01/2025</a:t>
             </a:fld>
             <a:endParaRPr lang="pt-BR"/>
           </a:p>
@@ -1348,7 +1348,7 @@
           <a:p>
             <a:fld id="{6A95A0BC-388F-4CA7-BE51-03B9510F86C7}" type="datetime1">
               <a:rPr lang="pt-BR" smtClean="0"/>
-              <a:t>31/12/2024</a:t>
+              <a:t>01/01/2025</a:t>
             </a:fld>
             <a:endParaRPr lang="pt-BR"/>
           </a:p>
@@ -1595,7 +1595,7 @@
           <a:p>
             <a:fld id="{920B0A53-1723-472B-8809-AF93A93C6B7D}" type="datetime1">
               <a:rPr lang="pt-BR" smtClean="0"/>
-              <a:t>31/12/2024</a:t>
+              <a:t>01/01/2025</a:t>
             </a:fld>
             <a:endParaRPr lang="pt-BR"/>
           </a:p>
@@ -1830,7 +1830,7 @@
           <a:p>
             <a:fld id="{F473D0C2-0B29-4E63-8862-AEF7CD2FD74C}" type="datetime1">
               <a:rPr lang="pt-BR" smtClean="0"/>
-              <a:t>31/12/2024</a:t>
+              <a:t>01/01/2025</a:t>
             </a:fld>
             <a:endParaRPr lang="pt-BR"/>
           </a:p>
@@ -2200,7 +2200,7 @@
           <a:p>
             <a:fld id="{10B68ADD-7F35-4AEB-BEB1-AD3CCDF011CE}" type="datetime1">
               <a:rPr lang="pt-BR" smtClean="0"/>
-              <a:t>31/12/2024</a:t>
+              <a:t>01/01/2025</a:t>
             </a:fld>
             <a:endParaRPr lang="pt-BR"/>
           </a:p>
@@ -2321,7 +2321,7 @@
           <a:p>
             <a:fld id="{ABF6779A-9BC4-4AC0-8880-1B792DDACBDD}" type="datetime1">
               <a:rPr lang="pt-BR" smtClean="0"/>
-              <a:t>31/12/2024</a:t>
+              <a:t>01/01/2025</a:t>
             </a:fld>
             <a:endParaRPr lang="pt-BR"/>
           </a:p>
@@ -2419,7 +2419,7 @@
           <a:p>
             <a:fld id="{E1175754-B528-45A3-9A7A-655123E17D0E}" type="datetime1">
               <a:rPr lang="pt-BR" smtClean="0"/>
-              <a:t>31/12/2024</a:t>
+              <a:t>01/01/2025</a:t>
             </a:fld>
             <a:endParaRPr lang="pt-BR"/>
           </a:p>
@@ -2699,7 +2699,7 @@
           <a:p>
             <a:fld id="{702BC77C-1A26-4515-863F-461CD234F563}" type="datetime1">
               <a:rPr lang="pt-BR" smtClean="0"/>
-              <a:t>31/12/2024</a:t>
+              <a:t>01/01/2025</a:t>
             </a:fld>
             <a:endParaRPr lang="pt-BR"/>
           </a:p>
@@ -2959,7 +2959,7 @@
           <a:p>
             <a:fld id="{2CE6D11F-A570-44DC-98A9-9E7070BCD645}" type="datetime1">
               <a:rPr lang="pt-BR" smtClean="0"/>
-              <a:t>31/12/2024</a:t>
+              <a:t>01/01/2025</a:t>
             </a:fld>
             <a:endParaRPr lang="pt-BR"/>
           </a:p>
@@ -3175,7 +3175,7 @@
           <a:p>
             <a:fld id="{925CAA1B-DFB8-467D-A20E-1BF5C572C99B}" type="datetime1">
               <a:rPr lang="pt-BR" smtClean="0"/>
-              <a:t>31/12/2024</a:t>
+              <a:t>01/01/2025</a:t>
             </a:fld>
             <a:endParaRPr lang="pt-BR"/>
           </a:p>
@@ -8084,38 +8084,6 @@
           </a:p>
         </p:txBody>
       </p:sp>
-      <p:pic>
-        <p:nvPicPr>
-          <p:cNvPr id="7" name="Imagem 6">
-            <a:extLst>
-              <a:ext uri="{FF2B5EF4-FFF2-40B4-BE49-F238E27FC236}">
-                <a16:creationId xmlns:a16="http://schemas.microsoft.com/office/drawing/2014/main" id="{5ED159E2-8571-206E-9E7A-2DF40D16BA3A}"/>
-              </a:ext>
-            </a:extLst>
-          </p:cNvPr>
-          <p:cNvPicPr>
-            <a:picLocks noChangeAspect="1"/>
-          </p:cNvPicPr>
-          <p:nvPr/>
-        </p:nvPicPr>
-        <p:blipFill>
-          <a:blip r:embed="rId2"/>
-          <a:stretch>
-            <a:fillRect/>
-          </a:stretch>
-        </p:blipFill>
-        <p:spPr>
-          <a:xfrm>
-            <a:off x="997620" y="8092106"/>
-            <a:ext cx="7816645" cy="2299795"/>
-          </a:xfrm>
-          <a:prstGeom prst="roundRect">
-            <a:avLst>
-              <a:gd name="adj" fmla="val 8384"/>
-            </a:avLst>
-          </a:prstGeom>
-        </p:spPr>
-      </p:pic>
       <p:sp>
         <p:nvSpPr>
           <p:cNvPr id="8" name="Retângulo 7">
@@ -8130,7 +8098,7 @@
         </p:nvSpPr>
         <p:spPr>
           <a:xfrm>
-            <a:off x="870768" y="7097501"/>
+            <a:off x="1150980" y="7097501"/>
             <a:ext cx="7562940" cy="646439"/>
           </a:xfrm>
           <a:prstGeom prst="rect">
@@ -8163,12 +8131,14 @@
           <a:p>
             <a:pPr algn="ctr"/>
             <a:r>
-              <a:rPr lang="pt-BR" b="1" dirty="0">
-                <a:hlinkClick r:id="rId3"/>
+              <a:rPr lang="pt-BR" sz="2400" b="1" dirty="0">
+                <a:solidFill>
+                  <a:schemeClr val="tx1"/>
+                </a:solidFill>
               </a:rPr>
-              <a:t>https://github.com/felipeAguiarCode/prompts-recipe-to-create-a-ebook</a:t>
-            </a:r>
-            <a:endParaRPr lang="pt-BR" b="1" dirty="0"/>
+              <a:t>https://github.com/RonaldoCaixaEconomica/E-Book.git</a:t>
+            </a:r>
+            <a:endParaRPr lang="pt-BR" sz="2400" b="1" dirty="0"/>
           </a:p>
         </p:txBody>
       </p:sp>
@@ -8187,11 +8157,11 @@
           <p:nvPr/>
         </p:nvPicPr>
         <p:blipFill>
-          <a:blip r:embed="rId4">
+          <a:blip r:embed="rId2">
             <a:extLst>
               <a:ext uri="{BEBA8EAE-BF5A-486C-A8C5-ECC9F3942E4B}">
                 <a14:imgProps xmlns:a14="http://schemas.microsoft.com/office/drawing/2010/main">
-                  <a14:imgLayer r:embed="rId5">
+                  <a14:imgLayer r:embed="rId3">
                     <a14:imgEffect>
                       <a14:backgroundRemoval t="10000" b="90000" l="10000" r="90000"/>
                     </a14:imgEffect>
@@ -8261,6 +8231,36 @@
           </a:p>
         </p:txBody>
       </p:sp>
+      <p:pic>
+        <p:nvPicPr>
+          <p:cNvPr id="4" name="Imagem 3">
+            <a:extLst>
+              <a:ext uri="{FF2B5EF4-FFF2-40B4-BE49-F238E27FC236}">
+                <a16:creationId xmlns:a16="http://schemas.microsoft.com/office/drawing/2014/main" id="{AC96B4B8-81B2-441F-A22C-52690FA0FC51}"/>
+              </a:ext>
+            </a:extLst>
+          </p:cNvPr>
+          <p:cNvPicPr>
+            <a:picLocks noChangeAspect="1"/>
+          </p:cNvPicPr>
+          <p:nvPr/>
+        </p:nvPicPr>
+        <p:blipFill>
+          <a:blip r:embed="rId4"/>
+          <a:stretch>
+            <a:fillRect/>
+          </a:stretch>
+        </p:blipFill>
+        <p:spPr>
+          <a:xfrm>
+            <a:off x="1640378" y="8200103"/>
+            <a:ext cx="6500731" cy="1675744"/>
+          </a:xfrm>
+          <a:prstGeom prst="rect">
+            <a:avLst/>
+          </a:prstGeom>
+        </p:spPr>
+      </p:pic>
     </p:spTree>
     <p:extLst>
       <p:ext uri="{BB962C8B-B14F-4D97-AF65-F5344CB8AC3E}">

</xml_diff>